<commit_message>
Updated readme with external libraries being used. Began working on presentation. Created Sample Data folder and moved sample data into that folder
</commit_message>
<xml_diff>
--- a/Presentation.pptx
+++ b/Presentation.pptx
@@ -3704,11 +3704,7 @@
           <a:p>
             <a:r>
               <a:rPr lang="en-CA" b="1" dirty="0" smtClean="0"/>
-              <a:t>Carleton </a:t>
-            </a:r>
-            <a:r>
-              <a:rPr lang="en-CA" b="1" dirty="0" smtClean="0"/>
-              <a:t>Engineering Competition 2016</a:t>
+              <a:t>Carleton Engineering Competition 2016</a:t>
             </a:r>
             <a:br>
               <a:rPr lang="en-CA" b="1" dirty="0" smtClean="0"/>
@@ -4005,6 +4001,46 @@
           <a:bodyPr/>
           <a:lstStyle/>
           <a:p>
+            <a:r>
+              <a:rPr lang="en-CA" dirty="0" smtClean="0"/>
+              <a:t>Create </a:t>
+            </a:r>
+            <a:r>
+              <a:rPr lang="en-CA" dirty="0" smtClean="0"/>
+              <a:t>easy </a:t>
+            </a:r>
+            <a:r>
+              <a:rPr lang="en-CA" dirty="0" smtClean="0"/>
+              <a:t>to </a:t>
+            </a:r>
+            <a:r>
+              <a:rPr lang="en-CA" dirty="0" smtClean="0"/>
+              <a:t>use, fully </a:t>
+            </a:r>
+            <a:r>
+              <a:rPr lang="en-CA" dirty="0" smtClean="0"/>
+              <a:t>autonomous management system</a:t>
+            </a:r>
+          </a:p>
+          <a:p>
+            <a:endParaRPr lang="en-CA" dirty="0" smtClean="0"/>
+          </a:p>
+          <a:p>
+            <a:r>
+              <a:rPr lang="en-CA" dirty="0" smtClean="0"/>
+              <a:t>Manage both products and volunteers</a:t>
+            </a:r>
+          </a:p>
+          <a:p>
+            <a:endParaRPr lang="en-CA" dirty="0" smtClean="0"/>
+          </a:p>
+          <a:p>
+            <a:r>
+              <a:rPr lang="en-CA" dirty="0" smtClean="0"/>
+              <a:t>Notify managers when to order new stock</a:t>
+            </a:r>
+          </a:p>
+          <a:p>
             <a:endParaRPr lang="en-CA" dirty="0"/>
           </a:p>
         </p:txBody>
@@ -4794,10 +4830,48 @@
         <p:spPr/>
         <p:txBody>
           <a:bodyPr>
-            <a:normAutofit/>
+            <a:normAutofit lnSpcReduction="10000"/>
           </a:bodyPr>
           <a:lstStyle/>
           <a:p>
+            <a:r>
+              <a:rPr lang="en-CA" dirty="0" smtClean="0"/>
+              <a:t>Recognize major obstacles, priorities</a:t>
+            </a:r>
+          </a:p>
+          <a:p>
+            <a:endParaRPr lang="en-CA" dirty="0" smtClean="0"/>
+          </a:p>
+          <a:p>
+            <a:r>
+              <a:rPr lang="en-CA" dirty="0" smtClean="0"/>
+              <a:t>Programming language selection </a:t>
+            </a:r>
+          </a:p>
+          <a:p>
+            <a:pPr lvl="1"/>
+            <a:r>
+              <a:rPr lang="en-CA" dirty="0" smtClean="0"/>
+              <a:t>Java</a:t>
+            </a:r>
+          </a:p>
+          <a:p>
+            <a:endParaRPr lang="en-CA" dirty="0" smtClean="0"/>
+          </a:p>
+          <a:p>
+            <a:r>
+              <a:rPr lang="en-CA" dirty="0" smtClean="0"/>
+              <a:t>Delegation of tasks</a:t>
+            </a:r>
+          </a:p>
+          <a:p>
+            <a:endParaRPr lang="en-CA" dirty="0" smtClean="0"/>
+          </a:p>
+          <a:p>
+            <a:r>
+              <a:rPr lang="en-CA" dirty="0" smtClean="0"/>
+              <a:t>Organization of database</a:t>
+            </a:r>
             <a:endParaRPr lang="en-CA" dirty="0" smtClean="0"/>
           </a:p>
         </p:txBody>
@@ -5317,6 +5391,27 @@
         <p:txBody>
           <a:bodyPr/>
           <a:lstStyle/>
+          <a:p>
+            <a:endParaRPr lang="en-CA" dirty="0" smtClean="0"/>
+          </a:p>
+          <a:p>
+            <a:endParaRPr lang="en-CA" dirty="0" smtClean="0"/>
+          </a:p>
+          <a:p>
+            <a:r>
+              <a:rPr lang="en-CA" dirty="0" smtClean="0"/>
+              <a:t>End-to-End development cycle</a:t>
+            </a:r>
+          </a:p>
+          <a:p>
+            <a:endParaRPr lang="en-CA" dirty="0" smtClean="0"/>
+          </a:p>
+          <a:p>
+            <a:r>
+              <a:rPr lang="en-CA" dirty="0" smtClean="0"/>
+              <a:t>Quick, regular team meetings to discuss major obstacles and progress</a:t>
+            </a:r>
+          </a:p>
           <a:p>
             <a:endParaRPr lang="en-CA" dirty="0" smtClean="0"/>
           </a:p>

</xml_diff>

<commit_message>
adding untested schedule generator
</commit_message>
<xml_diff>
--- a/Presentation.pptx
+++ b/Presentation.pptx
@@ -5,17 +5,18 @@
     <p:sldMasterId id="2147483648" r:id="rId1"/>
   </p:sldMasterIdLst>
   <p:notesMasterIdLst>
-    <p:notesMasterId r:id="rId10"/>
+    <p:notesMasterId r:id="rId11"/>
   </p:notesMasterIdLst>
   <p:sldIdLst>
     <p:sldId id="256" r:id="rId2"/>
     <p:sldId id="265" r:id="rId3"/>
-    <p:sldId id="267" r:id="rId4"/>
-    <p:sldId id="261" r:id="rId5"/>
-    <p:sldId id="258" r:id="rId6"/>
-    <p:sldId id="268" r:id="rId7"/>
-    <p:sldId id="263" r:id="rId8"/>
-    <p:sldId id="262" r:id="rId9"/>
+    <p:sldId id="269" r:id="rId4"/>
+    <p:sldId id="267" r:id="rId5"/>
+    <p:sldId id="261" r:id="rId6"/>
+    <p:sldId id="258" r:id="rId7"/>
+    <p:sldId id="268" r:id="rId8"/>
+    <p:sldId id="263" r:id="rId9"/>
+    <p:sldId id="262" r:id="rId10"/>
   </p:sldIdLst>
   <p:sldSz cx="9144000" cy="6858000" type="screen4x3"/>
   <p:notesSz cx="6858000" cy="9144000"/>
@@ -200,7 +201,7 @@
             <a:fld id="{B7C85491-E8B0-4F9F-900A-9BCAAC8D7210}" type="datetimeFigureOut">
               <a:rPr lang="en-US" smtClean="0"/>
               <a:pPr/>
-              <a:t>10/15/2016</a:t>
+              <a:t>10/16/2016</a:t>
             </a:fld>
             <a:endParaRPr lang="en-US"/>
           </a:p>
@@ -730,7 +731,7 @@
             <a:fld id="{3B1894FC-E103-41F5-BEC1-9C3532091CA7}" type="datetime1">
               <a:rPr lang="en-US" smtClean="0"/>
               <a:pPr/>
-              <a:t>10/15/2016</a:t>
+              <a:t>10/16/2016</a:t>
             </a:fld>
             <a:endParaRPr lang="en-CA"/>
           </a:p>
@@ -897,7 +898,7 @@
             <a:fld id="{31429BB7-F491-4DAE-9AE8-4F585E466CED}" type="datetime1">
               <a:rPr lang="en-US" smtClean="0"/>
               <a:pPr/>
-              <a:t>10/15/2016</a:t>
+              <a:t>10/16/2016</a:t>
             </a:fld>
             <a:endParaRPr lang="en-CA"/>
           </a:p>
@@ -1074,7 +1075,7 @@
             <a:fld id="{B29D62D9-8645-4901-AE86-1D5BE55BF8A5}" type="datetime1">
               <a:rPr lang="en-US" smtClean="0"/>
               <a:pPr/>
-              <a:t>10/15/2016</a:t>
+              <a:t>10/16/2016</a:t>
             </a:fld>
             <a:endParaRPr lang="en-CA"/>
           </a:p>
@@ -1241,7 +1242,7 @@
             <a:fld id="{F80D4BE0-6D42-4AF8-8FC2-85A10C674A42}" type="datetime1">
               <a:rPr lang="en-US" smtClean="0"/>
               <a:pPr/>
-              <a:t>10/15/2016</a:t>
+              <a:t>10/16/2016</a:t>
             </a:fld>
             <a:endParaRPr lang="en-CA"/>
           </a:p>
@@ -1484,7 +1485,7 @@
             <a:fld id="{717764C9-B656-4AB4-915E-031F82D736F1}" type="datetime1">
               <a:rPr lang="en-US" smtClean="0"/>
               <a:pPr/>
-              <a:t>10/15/2016</a:t>
+              <a:t>10/16/2016</a:t>
             </a:fld>
             <a:endParaRPr lang="en-CA"/>
           </a:p>
@@ -1769,7 +1770,7 @@
             <a:fld id="{EDE94880-70CF-4368-AF99-197295159A3D}" type="datetime1">
               <a:rPr lang="en-US" smtClean="0"/>
               <a:pPr/>
-              <a:t>10/15/2016</a:t>
+              <a:t>10/16/2016</a:t>
             </a:fld>
             <a:endParaRPr lang="en-CA"/>
           </a:p>
@@ -2188,7 +2189,7 @@
             <a:fld id="{E62B09E5-D1D7-4170-8307-C1534CDAF4F9}" type="datetime1">
               <a:rPr lang="en-US" smtClean="0"/>
               <a:pPr/>
-              <a:t>10/15/2016</a:t>
+              <a:t>10/16/2016</a:t>
             </a:fld>
             <a:endParaRPr lang="en-CA"/>
           </a:p>
@@ -2303,7 +2304,7 @@
             <a:fld id="{2C1E43BD-402D-48B6-99F1-6B33DC7A8045}" type="datetime1">
               <a:rPr lang="en-US" smtClean="0"/>
               <a:pPr/>
-              <a:t>10/15/2016</a:t>
+              <a:t>10/16/2016</a:t>
             </a:fld>
             <a:endParaRPr lang="en-CA"/>
           </a:p>
@@ -2395,7 +2396,7 @@
             <a:fld id="{59603D66-CAE1-4A28-92EA-E3E198D0192C}" type="datetime1">
               <a:rPr lang="en-US" smtClean="0"/>
               <a:pPr/>
-              <a:t>10/15/2016</a:t>
+              <a:t>10/16/2016</a:t>
             </a:fld>
             <a:endParaRPr lang="en-CA"/>
           </a:p>
@@ -2669,7 +2670,7 @@
             <a:fld id="{08DC18AA-4619-45D8-A70F-CB57C4D13107}" type="datetime1">
               <a:rPr lang="en-US" smtClean="0"/>
               <a:pPr/>
-              <a:t>10/15/2016</a:t>
+              <a:t>10/16/2016</a:t>
             </a:fld>
             <a:endParaRPr lang="en-CA"/>
           </a:p>
@@ -2919,7 +2920,7 @@
             <a:fld id="{64BB3973-35BD-4EAB-BFB8-51566BA65160}" type="datetime1">
               <a:rPr lang="en-US" smtClean="0"/>
               <a:pPr/>
-              <a:t>10/15/2016</a:t>
+              <a:t>10/16/2016</a:t>
             </a:fld>
             <a:endParaRPr lang="en-CA"/>
           </a:p>
@@ -3129,7 +3130,7 @@
             <a:fld id="{5C686656-FAE6-437C-8C68-DBF8B3DDF5A3}" type="datetime1">
               <a:rPr lang="en-US" smtClean="0"/>
               <a:pPr/>
-              <a:t>10/15/2016</a:t>
+              <a:t>10/16/2016</a:t>
             </a:fld>
             <a:endParaRPr lang="en-CA"/>
           </a:p>
@@ -4003,23 +4004,15 @@
           <a:p>
             <a:r>
               <a:rPr lang="en-CA" dirty="0" smtClean="0"/>
-              <a:t>Create </a:t>
+              <a:t>Create easy to use, </a:t>
             </a:r>
             <a:r>
               <a:rPr lang="en-CA" dirty="0" smtClean="0"/>
-              <a:t>easy </a:t>
+              <a:t>autonomous </a:t>
             </a:r>
             <a:r>
               <a:rPr lang="en-CA" dirty="0" smtClean="0"/>
-              <a:t>to </a:t>
-            </a:r>
-            <a:r>
-              <a:rPr lang="en-CA" dirty="0" smtClean="0"/>
-              <a:t>use, fully </a:t>
-            </a:r>
-            <a:r>
-              <a:rPr lang="en-CA" dirty="0" smtClean="0"/>
-              <a:t>autonomous management system</a:t>
+              <a:t>management system</a:t>
             </a:r>
           </a:p>
           <a:p>
@@ -4148,6 +4141,112 @@
           <a:chExt cx="0" cy="0"/>
         </a:xfrm>
       </p:grpSpPr>
+      <p:pic>
+        <p:nvPicPr>
+          <p:cNvPr id="5" name="Content Placeholder 4" descr="14102651_626210194208163_7391684745518559029_n.png"/>
+          <p:cNvPicPr>
+            <a:picLocks noGrp="1" noChangeAspect="1"/>
+          </p:cNvPicPr>
+          <p:nvPr>
+            <p:ph idx="1"/>
+          </p:nvPr>
+        </p:nvPicPr>
+        <p:blipFill>
+          <a:blip r:embed="rId2" cstate="print"/>
+          <a:stretch>
+            <a:fillRect/>
+          </a:stretch>
+        </p:blipFill>
+        <p:spPr>
+          <a:xfrm>
+            <a:off x="827584" y="188640"/>
+            <a:ext cx="7560840" cy="7560840"/>
+          </a:xfrm>
+        </p:spPr>
+      </p:pic>
+      <p:sp>
+        <p:nvSpPr>
+          <p:cNvPr id="2" name="Title 1"/>
+          <p:cNvSpPr>
+            <a:spLocks noGrp="1"/>
+          </p:cNvSpPr>
+          <p:nvPr>
+            <p:ph type="title"/>
+          </p:nvPr>
+        </p:nvSpPr>
+        <p:spPr/>
+        <p:txBody>
+          <a:bodyPr/>
+          <a:lstStyle/>
+          <a:p>
+            <a:r>
+              <a:rPr lang="en-US" b="1" i="1" dirty="0" smtClean="0">
+                <a:latin typeface="Constantia" pitchFamily="18" charset="0"/>
+              </a:rPr>
+              <a:t>SS Leos Management System</a:t>
+            </a:r>
+            <a:endParaRPr lang="en-US" b="1" i="1" dirty="0">
+              <a:latin typeface="Constantia" pitchFamily="18" charset="0"/>
+            </a:endParaRPr>
+          </a:p>
+        </p:txBody>
+      </p:sp>
+      <p:sp>
+        <p:nvSpPr>
+          <p:cNvPr id="4" name="Slide Number Placeholder 3"/>
+          <p:cNvSpPr>
+            <a:spLocks noGrp="1"/>
+          </p:cNvSpPr>
+          <p:nvPr>
+            <p:ph type="sldNum" sz="quarter" idx="12"/>
+          </p:nvPr>
+        </p:nvSpPr>
+        <p:spPr/>
+        <p:txBody>
+          <a:bodyPr/>
+          <a:lstStyle/>
+          <a:p>
+            <a:fld id="{3E1D218B-D0C8-4B57-A33A-A84CB916D2FC}" type="slidenum">
+              <a:rPr lang="en-CA" smtClean="0"/>
+              <a:pPr/>
+              <a:t>3</a:t>
+            </a:fld>
+            <a:endParaRPr lang="en-CA"/>
+          </a:p>
+        </p:txBody>
+      </p:sp>
+    </p:spTree>
+  </p:cSld>
+  <p:clrMapOvr>
+    <a:masterClrMapping/>
+  </p:clrMapOvr>
+  <p:timing>
+    <p:tnLst>
+      <p:par>
+        <p:cTn id="1" dur="indefinite" restart="never" nodeType="tmRoot"/>
+      </p:par>
+    </p:tnLst>
+  </p:timing>
+</p:sld>
+</file>
+
+<file path=ppt/slides/slide4.xml><?xml version="1.0" encoding="utf-8"?>
+<p:sld xmlns:a="http://schemas.openxmlformats.org/drawingml/2006/main" xmlns:r="http://schemas.openxmlformats.org/officeDocument/2006/relationships" xmlns:p="http://schemas.openxmlformats.org/presentationml/2006/main">
+  <p:cSld>
+    <p:spTree>
+      <p:nvGrpSpPr>
+        <p:cNvPr id="1" name=""/>
+        <p:cNvGrpSpPr/>
+        <p:nvPr/>
+      </p:nvGrpSpPr>
+      <p:grpSpPr>
+        <a:xfrm>
+          <a:off x="0" y="0"/>
+          <a:ext cx="0" cy="0"/>
+          <a:chOff x="0" y="0"/>
+          <a:chExt cx="0" cy="0"/>
+        </a:xfrm>
+      </p:grpSpPr>
       <p:sp>
         <p:nvSpPr>
           <p:cNvPr id="5" name="Rectangle 4"/>
@@ -4304,6 +4403,45 @@
           <a:bodyPr/>
           <a:lstStyle/>
           <a:p>
+            <a:r>
+              <a:rPr lang="en-CA" dirty="0" smtClean="0"/>
+              <a:t>Both overall and by-batch views</a:t>
+            </a:r>
+          </a:p>
+          <a:p>
+            <a:endParaRPr lang="en-CA" dirty="0" smtClean="0"/>
+          </a:p>
+          <a:p>
+            <a:r>
+              <a:rPr lang="en-CA" dirty="0" smtClean="0"/>
+              <a:t>Manager set re-stock limit</a:t>
+            </a:r>
+          </a:p>
+          <a:p>
+            <a:endParaRPr lang="en-CA" dirty="0" smtClean="0"/>
+          </a:p>
+          <a:p>
+            <a:r>
+              <a:rPr lang="en-CA" dirty="0" smtClean="0"/>
+              <a:t>Import from user friendly .</a:t>
+            </a:r>
+            <a:r>
+              <a:rPr lang="en-CA" dirty="0" err="1" smtClean="0"/>
+              <a:t>docx</a:t>
+            </a:r>
+            <a:r>
+              <a:rPr lang="en-CA" dirty="0" smtClean="0"/>
+              <a:t> files</a:t>
+            </a:r>
+          </a:p>
+          <a:p>
+            <a:endParaRPr lang="en-CA" dirty="0" smtClean="0"/>
+          </a:p>
+          <a:p>
+            <a:r>
+              <a:rPr lang="en-CA" dirty="0" smtClean="0"/>
+              <a:t> </a:t>
+            </a:r>
             <a:endParaRPr lang="en-CA" dirty="0" smtClean="0"/>
           </a:p>
         </p:txBody>
@@ -4373,7 +4511,7 @@
             <a:fld id="{3E1D218B-D0C8-4B57-A33A-A84CB916D2FC}" type="slidenum">
               <a:rPr lang="en-CA" smtClean="0"/>
               <a:pPr/>
-              <a:t>3</a:t>
+              <a:t>4</a:t>
             </a:fld>
             <a:endParaRPr lang="en-CA" dirty="0"/>
           </a:p>
@@ -4384,293 +4522,13 @@
   <p:clrMapOvr>
     <a:masterClrMapping/>
   </p:clrMapOvr>
-</p:sld>
-</file>
-
-<file path=ppt/slides/slide4.xml><?xml version="1.0" encoding="utf-8"?>
-<p:sld xmlns:a="http://schemas.openxmlformats.org/drawingml/2006/main" xmlns:r="http://schemas.openxmlformats.org/officeDocument/2006/relationships" xmlns:p="http://schemas.openxmlformats.org/presentationml/2006/main">
-  <p:cSld>
-    <p:bg>
-      <p:bgPr>
-        <a:solidFill>
-          <a:schemeClr val="bg1"/>
-        </a:solidFill>
-        <a:effectLst/>
-      </p:bgPr>
-    </p:bg>
-    <p:spTree>
-      <p:nvGrpSpPr>
-        <p:cNvPr id="1" name=""/>
-        <p:cNvGrpSpPr/>
-        <p:nvPr/>
-      </p:nvGrpSpPr>
-      <p:grpSpPr>
-        <a:xfrm>
-          <a:off x="0" y="0"/>
-          <a:ext cx="0" cy="0"/>
-          <a:chOff x="0" y="0"/>
-          <a:chExt cx="0" cy="0"/>
-        </a:xfrm>
-      </p:grpSpPr>
-      <p:sp>
-        <p:nvSpPr>
-          <p:cNvPr id="5" name="Rectangle 4"/>
-          <p:cNvSpPr/>
-          <p:nvPr/>
-        </p:nvSpPr>
-        <p:spPr>
-          <a:xfrm>
-            <a:off x="2214546" y="6286520"/>
-            <a:ext cx="6786610" cy="285752"/>
-          </a:xfrm>
-          <a:prstGeom prst="rect">
-            <a:avLst/>
-          </a:prstGeom>
-          <a:solidFill>
-            <a:srgbClr val="FF0000">
-              <a:alpha val="90000"/>
-            </a:srgbClr>
-          </a:solidFill>
-          <a:ln>
-            <a:noFill/>
-          </a:ln>
-        </p:spPr>
-        <p:style>
-          <a:lnRef idx="2">
-            <a:schemeClr val="accent1">
-              <a:shade val="50000"/>
-            </a:schemeClr>
-          </a:lnRef>
-          <a:fillRef idx="1">
-            <a:schemeClr val="accent1"/>
-          </a:fillRef>
-          <a:effectRef idx="0">
-            <a:schemeClr val="accent1"/>
-          </a:effectRef>
-          <a:fontRef idx="minor">
-            <a:schemeClr val="lt1"/>
-          </a:fontRef>
-        </p:style>
-        <p:txBody>
-          <a:bodyPr rtlCol="0" anchor="ctr"/>
-          <a:lstStyle/>
-          <a:p>
-            <a:pPr algn="ctr"/>
-            <a:endParaRPr lang="en-CA"/>
-          </a:p>
-        </p:txBody>
-      </p:sp>
-      <p:pic>
-        <p:nvPicPr>
-          <p:cNvPr id="6" name="Picture 5" descr="CarletonLogo.gif"/>
-          <p:cNvPicPr>
-            <a:picLocks noChangeAspect="1"/>
-          </p:cNvPicPr>
-          <p:nvPr/>
-        </p:nvPicPr>
-        <p:blipFill>
-          <a:blip r:embed="rId2" cstate="print"/>
-          <a:stretch>
-            <a:fillRect/>
-          </a:stretch>
-        </p:blipFill>
-        <p:spPr>
-          <a:xfrm>
-            <a:off x="142844" y="6215082"/>
-            <a:ext cx="1940334" cy="500042"/>
-          </a:xfrm>
-          <a:prstGeom prst="rect">
-            <a:avLst/>
-          </a:prstGeom>
-        </p:spPr>
-      </p:pic>
-      <p:sp>
-        <p:nvSpPr>
-          <p:cNvPr id="7" name="Rectangle 6"/>
-          <p:cNvSpPr/>
-          <p:nvPr/>
-        </p:nvSpPr>
-        <p:spPr>
-          <a:xfrm flipV="1">
-            <a:off x="2214546" y="6572272"/>
-            <a:ext cx="6786610" cy="142876"/>
-          </a:xfrm>
-          <a:prstGeom prst="rect">
-            <a:avLst/>
-          </a:prstGeom>
-          <a:solidFill>
-            <a:schemeClr val="tx1"/>
-          </a:solidFill>
-          <a:ln>
-            <a:noFill/>
-          </a:ln>
-        </p:spPr>
-        <p:style>
-          <a:lnRef idx="2">
-            <a:schemeClr val="accent1">
-              <a:shade val="50000"/>
-            </a:schemeClr>
-          </a:lnRef>
-          <a:fillRef idx="1">
-            <a:schemeClr val="accent1"/>
-          </a:fillRef>
-          <a:effectRef idx="0">
-            <a:schemeClr val="accent1"/>
-          </a:effectRef>
-          <a:fontRef idx="minor">
-            <a:schemeClr val="lt1"/>
-          </a:fontRef>
-        </p:style>
-        <p:txBody>
-          <a:bodyPr rtlCol="0" anchor="ctr"/>
-          <a:lstStyle/>
-          <a:p>
-            <a:pPr algn="ctr"/>
-            <a:endParaRPr lang="en-CA"/>
-          </a:p>
-        </p:txBody>
-      </p:sp>
-      <p:sp>
-        <p:nvSpPr>
-          <p:cNvPr id="10" name="Title 9"/>
-          <p:cNvSpPr>
-            <a:spLocks noGrp="1"/>
-          </p:cNvSpPr>
-          <p:nvPr>
-            <p:ph type="title"/>
-          </p:nvPr>
-        </p:nvSpPr>
-        <p:spPr/>
-        <p:txBody>
-          <a:bodyPr/>
-          <a:lstStyle/>
-          <a:p>
-            <a:r>
-              <a:rPr lang="en-CA" b="1" dirty="0" smtClean="0"/>
-              <a:t>Benefits Of Our Program</a:t>
-            </a:r>
-            <a:endParaRPr lang="en-CA" b="1" dirty="0"/>
-          </a:p>
-        </p:txBody>
-      </p:sp>
-      <p:sp>
-        <p:nvSpPr>
-          <p:cNvPr id="11" name="Content Placeholder 10"/>
-          <p:cNvSpPr>
-            <a:spLocks noGrp="1"/>
-          </p:cNvSpPr>
-          <p:nvPr>
-            <p:ph idx="1"/>
-          </p:nvPr>
-        </p:nvSpPr>
-        <p:spPr/>
-        <p:txBody>
-          <a:bodyPr/>
-          <a:lstStyle/>
-          <a:p>
-            <a:r>
-              <a:rPr lang="en-CA" dirty="0" smtClean="0"/>
-              <a:t>Easily </a:t>
-            </a:r>
-            <a:r>
-              <a:rPr lang="en-CA" dirty="0" smtClean="0"/>
-              <a:t>maintainable and scalable</a:t>
-            </a:r>
-            <a:endParaRPr lang="en-CA" dirty="0" smtClean="0"/>
-          </a:p>
-          <a:p>
-            <a:endParaRPr lang="en-CA" dirty="0" smtClean="0"/>
-          </a:p>
-          <a:p>
-            <a:r>
-              <a:rPr lang="en-CA" dirty="0" smtClean="0"/>
-              <a:t>User friendly, simple intuitive design</a:t>
-            </a:r>
-          </a:p>
-          <a:p>
-            <a:endParaRPr lang="en-CA" dirty="0" smtClean="0"/>
-          </a:p>
-          <a:p>
-            <a:endParaRPr lang="en-CA" dirty="0"/>
-          </a:p>
-        </p:txBody>
-      </p:sp>
-      <p:cxnSp>
-        <p:nvCxnSpPr>
-          <p:cNvPr id="12" name="Straight Connector 11"/>
-          <p:cNvCxnSpPr/>
-          <p:nvPr/>
-        </p:nvCxnSpPr>
-        <p:spPr>
-          <a:xfrm>
-            <a:off x="2214546" y="6572272"/>
-            <a:ext cx="6786610" cy="1588"/>
-          </a:xfrm>
-          <a:prstGeom prst="line">
-            <a:avLst/>
-          </a:prstGeom>
-          <a:ln w="12700">
-            <a:solidFill>
-              <a:schemeClr val="bg1"/>
-            </a:solidFill>
-          </a:ln>
-          <a:effectLst>
-            <a:outerShdw blurRad="88900" sx="102000" sy="102000" algn="ctr" rotWithShape="0">
-              <a:schemeClr val="bg1">
-                <a:alpha val="61000"/>
-              </a:schemeClr>
-            </a:outerShdw>
-          </a:effectLst>
-        </p:spPr>
-        <p:style>
-          <a:lnRef idx="1">
-            <a:schemeClr val="accent1"/>
-          </a:lnRef>
-          <a:fillRef idx="0">
-            <a:schemeClr val="accent1"/>
-          </a:fillRef>
-          <a:effectRef idx="0">
-            <a:schemeClr val="accent1"/>
-          </a:effectRef>
-          <a:fontRef idx="minor">
-            <a:schemeClr val="tx1"/>
-          </a:fontRef>
-        </p:style>
-      </p:cxnSp>
-      <p:sp>
-        <p:nvSpPr>
-          <p:cNvPr id="9" name="Slide Number Placeholder 8"/>
-          <p:cNvSpPr>
-            <a:spLocks noGrp="1"/>
-          </p:cNvSpPr>
-          <p:nvPr>
-            <p:ph type="sldNum" sz="quarter" idx="12"/>
-          </p:nvPr>
-        </p:nvSpPr>
-        <p:spPr>
-          <a:xfrm>
-            <a:off x="6553200" y="6286520"/>
-            <a:ext cx="2133600" cy="365125"/>
-          </a:xfrm>
-        </p:spPr>
-        <p:txBody>
-          <a:bodyPr/>
-          <a:lstStyle/>
-          <a:p>
-            <a:fld id="{3E1D218B-D0C8-4B57-A33A-A84CB916D2FC}" type="slidenum">
-              <a:rPr lang="en-CA" smtClean="0"/>
-              <a:pPr/>
-              <a:t>4</a:t>
-            </a:fld>
-            <a:endParaRPr lang="en-CA" dirty="0"/>
-          </a:p>
-        </p:txBody>
-      </p:sp>
-    </p:spTree>
-  </p:cSld>
-  <p:clrMapOvr>
-    <a:masterClrMapping/>
-  </p:clrMapOvr>
+  <p:timing>
+    <p:tnLst>
+      <p:par>
+        <p:cTn id="1" dur="indefinite" restart="never" nodeType="tmRoot"/>
+      </p:par>
+    </p:tnLst>
+  </p:timing>
 </p:sld>
 </file>
 
@@ -4834,7 +4692,7 @@
           <a:p>
             <a:r>
               <a:rPr lang="en-CA" b="1" dirty="0" smtClean="0"/>
-              <a:t>Initial Challenge Approach</a:t>
+              <a:t>Benefits Of Our Program</a:t>
             </a:r>
             <a:endParaRPr lang="en-CA" b="1" dirty="0"/>
           </a:p>
@@ -4852,14 +4710,12 @@
         </p:nvSpPr>
         <p:spPr/>
         <p:txBody>
-          <a:bodyPr>
-            <a:normAutofit lnSpcReduction="10000"/>
-          </a:bodyPr>
+          <a:bodyPr/>
           <a:lstStyle/>
           <a:p>
             <a:r>
               <a:rPr lang="en-CA" dirty="0" smtClean="0"/>
-              <a:t>Recognize major obstacles, priorities</a:t>
+              <a:t>Easily maintainable and scalable</a:t>
             </a:r>
           </a:p>
           <a:p>
@@ -4868,32 +4724,16 @@
           <a:p>
             <a:r>
               <a:rPr lang="en-CA" dirty="0" smtClean="0"/>
-              <a:t>Programming language selection </a:t>
-            </a:r>
-          </a:p>
-          <a:p>
-            <a:pPr lvl="1"/>
+              <a:t>User friendly, simple intuitive design</a:t>
+            </a:r>
+          </a:p>
+          <a:p>
+            <a:endParaRPr lang="en-CA" dirty="0" smtClean="0"/>
+          </a:p>
+          <a:p>
             <a:r>
               <a:rPr lang="en-CA" dirty="0" smtClean="0"/>
-              <a:t>Java</a:t>
-            </a:r>
-          </a:p>
-          <a:p>
-            <a:endParaRPr lang="en-CA" dirty="0" smtClean="0"/>
-          </a:p>
-          <a:p>
-            <a:r>
-              <a:rPr lang="en-CA" dirty="0" smtClean="0"/>
-              <a:t>Delegation of tasks</a:t>
-            </a:r>
-          </a:p>
-          <a:p>
-            <a:endParaRPr lang="en-CA" dirty="0" smtClean="0"/>
-          </a:p>
-          <a:p>
-            <a:r>
-              <a:rPr lang="en-CA" dirty="0" smtClean="0"/>
-              <a:t>Organization of database</a:t>
+              <a:t>Designed for the future</a:t>
             </a:r>
             <a:endParaRPr lang="en-CA" dirty="0" smtClean="0"/>
           </a:p>
@@ -4943,7 +4783,7 @@
       </p:cxnSp>
       <p:sp>
         <p:nvSpPr>
-          <p:cNvPr id="14" name="Slide Number Placeholder 13"/>
+          <p:cNvPr id="9" name="Slide Number Placeholder 8"/>
           <p:cNvSpPr>
             <a:spLocks noGrp="1"/>
           </p:cNvSpPr>
@@ -4979,262 +4819,6 @@
 </file>
 
 <file path=ppt/slides/slide6.xml><?xml version="1.0" encoding="utf-8"?>
-<p:sld xmlns:a="http://schemas.openxmlformats.org/drawingml/2006/main" xmlns:r="http://schemas.openxmlformats.org/officeDocument/2006/relationships" xmlns:p="http://schemas.openxmlformats.org/presentationml/2006/main">
-  <p:cSld>
-    <p:spTree>
-      <p:nvGrpSpPr>
-        <p:cNvPr id="1" name=""/>
-        <p:cNvGrpSpPr/>
-        <p:nvPr/>
-      </p:nvGrpSpPr>
-      <p:grpSpPr>
-        <a:xfrm>
-          <a:off x="0" y="0"/>
-          <a:ext cx="0" cy="0"/>
-          <a:chOff x="0" y="0"/>
-          <a:chExt cx="0" cy="0"/>
-        </a:xfrm>
-      </p:grpSpPr>
-      <p:sp>
-        <p:nvSpPr>
-          <p:cNvPr id="5" name="Rectangle 4"/>
-          <p:cNvSpPr/>
-          <p:nvPr/>
-        </p:nvSpPr>
-        <p:spPr>
-          <a:xfrm>
-            <a:off x="2214546" y="6286520"/>
-            <a:ext cx="6786610" cy="285752"/>
-          </a:xfrm>
-          <a:prstGeom prst="rect">
-            <a:avLst/>
-          </a:prstGeom>
-          <a:solidFill>
-            <a:srgbClr val="FF0000">
-              <a:alpha val="90000"/>
-            </a:srgbClr>
-          </a:solidFill>
-          <a:ln>
-            <a:noFill/>
-          </a:ln>
-        </p:spPr>
-        <p:style>
-          <a:lnRef idx="2">
-            <a:schemeClr val="accent1">
-              <a:shade val="50000"/>
-            </a:schemeClr>
-          </a:lnRef>
-          <a:fillRef idx="1">
-            <a:schemeClr val="accent1"/>
-          </a:fillRef>
-          <a:effectRef idx="0">
-            <a:schemeClr val="accent1"/>
-          </a:effectRef>
-          <a:fontRef idx="minor">
-            <a:schemeClr val="lt1"/>
-          </a:fontRef>
-        </p:style>
-        <p:txBody>
-          <a:bodyPr rtlCol="0" anchor="ctr"/>
-          <a:lstStyle/>
-          <a:p>
-            <a:pPr algn="ctr"/>
-            <a:endParaRPr lang="en-CA"/>
-          </a:p>
-        </p:txBody>
-      </p:sp>
-      <p:pic>
-        <p:nvPicPr>
-          <p:cNvPr id="6" name="Picture 5" descr="CarletonLogo.gif"/>
-          <p:cNvPicPr>
-            <a:picLocks noChangeAspect="1"/>
-          </p:cNvPicPr>
-          <p:nvPr/>
-        </p:nvPicPr>
-        <p:blipFill>
-          <a:blip r:embed="rId2" cstate="print"/>
-          <a:stretch>
-            <a:fillRect/>
-          </a:stretch>
-        </p:blipFill>
-        <p:spPr>
-          <a:xfrm>
-            <a:off x="142844" y="6215082"/>
-            <a:ext cx="1940334" cy="500042"/>
-          </a:xfrm>
-          <a:prstGeom prst="rect">
-            <a:avLst/>
-          </a:prstGeom>
-        </p:spPr>
-      </p:pic>
-      <p:sp>
-        <p:nvSpPr>
-          <p:cNvPr id="7" name="Rectangle 6"/>
-          <p:cNvSpPr/>
-          <p:nvPr/>
-        </p:nvSpPr>
-        <p:spPr>
-          <a:xfrm flipV="1">
-            <a:off x="2214546" y="6572272"/>
-            <a:ext cx="6786610" cy="142876"/>
-          </a:xfrm>
-          <a:prstGeom prst="rect">
-            <a:avLst/>
-          </a:prstGeom>
-          <a:solidFill>
-            <a:schemeClr val="tx1"/>
-          </a:solidFill>
-          <a:ln>
-            <a:noFill/>
-          </a:ln>
-        </p:spPr>
-        <p:style>
-          <a:lnRef idx="2">
-            <a:schemeClr val="accent1">
-              <a:shade val="50000"/>
-            </a:schemeClr>
-          </a:lnRef>
-          <a:fillRef idx="1">
-            <a:schemeClr val="accent1"/>
-          </a:fillRef>
-          <a:effectRef idx="0">
-            <a:schemeClr val="accent1"/>
-          </a:effectRef>
-          <a:fontRef idx="minor">
-            <a:schemeClr val="lt1"/>
-          </a:fontRef>
-        </p:style>
-        <p:txBody>
-          <a:bodyPr rtlCol="0" anchor="ctr"/>
-          <a:lstStyle/>
-          <a:p>
-            <a:pPr algn="ctr"/>
-            <a:endParaRPr lang="en-CA"/>
-          </a:p>
-        </p:txBody>
-      </p:sp>
-      <p:sp>
-        <p:nvSpPr>
-          <p:cNvPr id="10" name="Title 9"/>
-          <p:cNvSpPr>
-            <a:spLocks noGrp="1"/>
-          </p:cNvSpPr>
-          <p:nvPr>
-            <p:ph type="title"/>
-          </p:nvPr>
-        </p:nvSpPr>
-        <p:spPr/>
-        <p:txBody>
-          <a:bodyPr/>
-          <a:lstStyle/>
-          <a:p>
-            <a:r>
-              <a:rPr lang="en-CA" b="1" dirty="0" smtClean="0"/>
-              <a:t>Design Process</a:t>
-            </a:r>
-            <a:endParaRPr lang="en-CA" b="1" dirty="0"/>
-          </a:p>
-        </p:txBody>
-      </p:sp>
-      <p:sp>
-        <p:nvSpPr>
-          <p:cNvPr id="11" name="Content Placeholder 10"/>
-          <p:cNvSpPr>
-            <a:spLocks noGrp="1"/>
-          </p:cNvSpPr>
-          <p:nvPr>
-            <p:ph idx="1"/>
-          </p:nvPr>
-        </p:nvSpPr>
-        <p:spPr/>
-        <p:txBody>
-          <a:bodyPr/>
-          <a:lstStyle/>
-          <a:p>
-            <a:endParaRPr lang="en-CA" dirty="0" smtClean="0"/>
-          </a:p>
-        </p:txBody>
-      </p:sp>
-      <p:cxnSp>
-        <p:nvCxnSpPr>
-          <p:cNvPr id="12" name="Straight Connector 11"/>
-          <p:cNvCxnSpPr/>
-          <p:nvPr/>
-        </p:nvCxnSpPr>
-        <p:spPr>
-          <a:xfrm>
-            <a:off x="2214546" y="6572272"/>
-            <a:ext cx="6786610" cy="1588"/>
-          </a:xfrm>
-          <a:prstGeom prst="line">
-            <a:avLst/>
-          </a:prstGeom>
-          <a:ln w="12700">
-            <a:solidFill>
-              <a:schemeClr val="bg1"/>
-            </a:solidFill>
-          </a:ln>
-          <a:effectLst>
-            <a:outerShdw blurRad="88900" sx="102000" sy="102000" algn="ctr" rotWithShape="0">
-              <a:schemeClr val="bg1">
-                <a:alpha val="61000"/>
-              </a:schemeClr>
-            </a:outerShdw>
-          </a:effectLst>
-        </p:spPr>
-        <p:style>
-          <a:lnRef idx="1">
-            <a:schemeClr val="accent1"/>
-          </a:lnRef>
-          <a:fillRef idx="0">
-            <a:schemeClr val="accent1"/>
-          </a:fillRef>
-          <a:effectRef idx="0">
-            <a:schemeClr val="accent1"/>
-          </a:effectRef>
-          <a:fontRef idx="minor">
-            <a:schemeClr val="tx1"/>
-          </a:fontRef>
-        </p:style>
-      </p:cxnSp>
-      <p:sp>
-        <p:nvSpPr>
-          <p:cNvPr id="9" name="Slide Number Placeholder 8"/>
-          <p:cNvSpPr>
-            <a:spLocks noGrp="1"/>
-          </p:cNvSpPr>
-          <p:nvPr>
-            <p:ph type="sldNum" sz="quarter" idx="12"/>
-          </p:nvPr>
-        </p:nvSpPr>
-        <p:spPr>
-          <a:xfrm>
-            <a:off x="6553200" y="6286520"/>
-            <a:ext cx="2133600" cy="365125"/>
-          </a:xfrm>
-        </p:spPr>
-        <p:txBody>
-          <a:bodyPr/>
-          <a:lstStyle/>
-          <a:p>
-            <a:fld id="{3E1D218B-D0C8-4B57-A33A-A84CB916D2FC}" type="slidenum">
-              <a:rPr lang="en-CA" smtClean="0"/>
-              <a:pPr/>
-              <a:t>6</a:t>
-            </a:fld>
-            <a:endParaRPr lang="en-CA" dirty="0"/>
-          </a:p>
-        </p:txBody>
-      </p:sp>
-    </p:spTree>
-  </p:cSld>
-  <p:clrMapOvr>
-    <a:masterClrMapping/>
-  </p:clrMapOvr>
-</p:sld>
-</file>
-
-<file path=ppt/slides/slide7.xml><?xml version="1.0" encoding="utf-8"?>
 <p:sld xmlns:a="http://schemas.openxmlformats.org/drawingml/2006/main" xmlns:r="http://schemas.openxmlformats.org/officeDocument/2006/relationships" xmlns:p="http://schemas.openxmlformats.org/presentationml/2006/main">
   <p:cSld>
     <p:bg>
@@ -5394,7 +4978,7 @@
           <a:p>
             <a:r>
               <a:rPr lang="en-CA" b="1" dirty="0" smtClean="0"/>
-              <a:t>Development Process</a:t>
+              <a:t>Initial Challenge Approach</a:t>
             </a:r>
             <a:endParaRPr lang="en-CA" b="1" dirty="0"/>
           </a:p>
@@ -5412,18 +4996,39 @@
         </p:nvSpPr>
         <p:spPr/>
         <p:txBody>
-          <a:bodyPr/>
-          <a:lstStyle/>
+          <a:bodyPr>
+            <a:normAutofit lnSpcReduction="10000"/>
+          </a:bodyPr>
+          <a:lstStyle/>
+          <a:p>
+            <a:r>
+              <a:rPr lang="en-CA" dirty="0" smtClean="0"/>
+              <a:t>Recognize major obstacles, priorities</a:t>
+            </a:r>
+          </a:p>
           <a:p>
             <a:endParaRPr lang="en-CA" dirty="0" smtClean="0"/>
           </a:p>
           <a:p>
+            <a:r>
+              <a:rPr lang="en-CA" dirty="0" smtClean="0"/>
+              <a:t>Programming language selection </a:t>
+            </a:r>
+          </a:p>
+          <a:p>
+            <a:pPr lvl="1"/>
+            <a:r>
+              <a:rPr lang="en-CA" dirty="0" smtClean="0"/>
+              <a:t>Java</a:t>
+            </a:r>
+          </a:p>
+          <a:p>
             <a:endParaRPr lang="en-CA" dirty="0" smtClean="0"/>
           </a:p>
           <a:p>
             <a:r>
               <a:rPr lang="en-CA" dirty="0" smtClean="0"/>
-              <a:t>End-to-End development cycle</a:t>
+              <a:t>Delegation of tasks</a:t>
             </a:r>
           </a:p>
           <a:p>
@@ -5432,8 +5037,288 @@
           <a:p>
             <a:r>
               <a:rPr lang="en-CA" dirty="0" smtClean="0"/>
-              <a:t>Quick, regular team meetings to discuss major obstacles and progress</a:t>
-            </a:r>
+              <a:t>Organization of database</a:t>
+            </a:r>
+          </a:p>
+        </p:txBody>
+      </p:sp>
+      <p:cxnSp>
+        <p:nvCxnSpPr>
+          <p:cNvPr id="12" name="Straight Connector 11"/>
+          <p:cNvCxnSpPr/>
+          <p:nvPr/>
+        </p:nvCxnSpPr>
+        <p:spPr>
+          <a:xfrm>
+            <a:off x="2214546" y="6572272"/>
+            <a:ext cx="6786610" cy="1588"/>
+          </a:xfrm>
+          <a:prstGeom prst="line">
+            <a:avLst/>
+          </a:prstGeom>
+          <a:ln w="12700">
+            <a:solidFill>
+              <a:schemeClr val="bg1"/>
+            </a:solidFill>
+          </a:ln>
+          <a:effectLst>
+            <a:outerShdw blurRad="88900" sx="102000" sy="102000" algn="ctr" rotWithShape="0">
+              <a:schemeClr val="bg1">
+                <a:alpha val="61000"/>
+              </a:schemeClr>
+            </a:outerShdw>
+          </a:effectLst>
+        </p:spPr>
+        <p:style>
+          <a:lnRef idx="1">
+            <a:schemeClr val="accent1"/>
+          </a:lnRef>
+          <a:fillRef idx="0">
+            <a:schemeClr val="accent1"/>
+          </a:fillRef>
+          <a:effectRef idx="0">
+            <a:schemeClr val="accent1"/>
+          </a:effectRef>
+          <a:fontRef idx="minor">
+            <a:schemeClr val="tx1"/>
+          </a:fontRef>
+        </p:style>
+      </p:cxnSp>
+      <p:sp>
+        <p:nvSpPr>
+          <p:cNvPr id="14" name="Slide Number Placeholder 13"/>
+          <p:cNvSpPr>
+            <a:spLocks noGrp="1"/>
+          </p:cNvSpPr>
+          <p:nvPr>
+            <p:ph type="sldNum" sz="quarter" idx="12"/>
+          </p:nvPr>
+        </p:nvSpPr>
+        <p:spPr>
+          <a:xfrm>
+            <a:off x="6553200" y="6286520"/>
+            <a:ext cx="2133600" cy="365125"/>
+          </a:xfrm>
+        </p:spPr>
+        <p:txBody>
+          <a:bodyPr/>
+          <a:lstStyle/>
+          <a:p>
+            <a:fld id="{3E1D218B-D0C8-4B57-A33A-A84CB916D2FC}" type="slidenum">
+              <a:rPr lang="en-CA" smtClean="0"/>
+              <a:pPr/>
+              <a:t>6</a:t>
+            </a:fld>
+            <a:endParaRPr lang="en-CA" dirty="0"/>
+          </a:p>
+        </p:txBody>
+      </p:sp>
+    </p:spTree>
+  </p:cSld>
+  <p:clrMapOvr>
+    <a:masterClrMapping/>
+  </p:clrMapOvr>
+</p:sld>
+</file>
+
+<file path=ppt/slides/slide7.xml><?xml version="1.0" encoding="utf-8"?>
+<p:sld xmlns:a="http://schemas.openxmlformats.org/drawingml/2006/main" xmlns:r="http://schemas.openxmlformats.org/officeDocument/2006/relationships" xmlns:p="http://schemas.openxmlformats.org/presentationml/2006/main">
+  <p:cSld>
+    <p:spTree>
+      <p:nvGrpSpPr>
+        <p:cNvPr id="1" name=""/>
+        <p:cNvGrpSpPr/>
+        <p:nvPr/>
+      </p:nvGrpSpPr>
+      <p:grpSpPr>
+        <a:xfrm>
+          <a:off x="0" y="0"/>
+          <a:ext cx="0" cy="0"/>
+          <a:chOff x="0" y="0"/>
+          <a:chExt cx="0" cy="0"/>
+        </a:xfrm>
+      </p:grpSpPr>
+      <p:sp>
+        <p:nvSpPr>
+          <p:cNvPr id="5" name="Rectangle 4"/>
+          <p:cNvSpPr/>
+          <p:nvPr/>
+        </p:nvSpPr>
+        <p:spPr>
+          <a:xfrm>
+            <a:off x="2214546" y="6286520"/>
+            <a:ext cx="6786610" cy="285752"/>
+          </a:xfrm>
+          <a:prstGeom prst="rect">
+            <a:avLst/>
+          </a:prstGeom>
+          <a:solidFill>
+            <a:srgbClr val="FF0000">
+              <a:alpha val="90000"/>
+            </a:srgbClr>
+          </a:solidFill>
+          <a:ln>
+            <a:noFill/>
+          </a:ln>
+        </p:spPr>
+        <p:style>
+          <a:lnRef idx="2">
+            <a:schemeClr val="accent1">
+              <a:shade val="50000"/>
+            </a:schemeClr>
+          </a:lnRef>
+          <a:fillRef idx="1">
+            <a:schemeClr val="accent1"/>
+          </a:fillRef>
+          <a:effectRef idx="0">
+            <a:schemeClr val="accent1"/>
+          </a:effectRef>
+          <a:fontRef idx="minor">
+            <a:schemeClr val="lt1"/>
+          </a:fontRef>
+        </p:style>
+        <p:txBody>
+          <a:bodyPr rtlCol="0" anchor="ctr"/>
+          <a:lstStyle/>
+          <a:p>
+            <a:pPr algn="ctr"/>
+            <a:endParaRPr lang="en-CA"/>
+          </a:p>
+        </p:txBody>
+      </p:sp>
+      <p:pic>
+        <p:nvPicPr>
+          <p:cNvPr id="6" name="Picture 5" descr="CarletonLogo.gif"/>
+          <p:cNvPicPr>
+            <a:picLocks noChangeAspect="1"/>
+          </p:cNvPicPr>
+          <p:nvPr/>
+        </p:nvPicPr>
+        <p:blipFill>
+          <a:blip r:embed="rId2" cstate="print"/>
+          <a:stretch>
+            <a:fillRect/>
+          </a:stretch>
+        </p:blipFill>
+        <p:spPr>
+          <a:xfrm>
+            <a:off x="142844" y="6215082"/>
+            <a:ext cx="1940334" cy="500042"/>
+          </a:xfrm>
+          <a:prstGeom prst="rect">
+            <a:avLst/>
+          </a:prstGeom>
+        </p:spPr>
+      </p:pic>
+      <p:sp>
+        <p:nvSpPr>
+          <p:cNvPr id="7" name="Rectangle 6"/>
+          <p:cNvSpPr/>
+          <p:nvPr/>
+        </p:nvSpPr>
+        <p:spPr>
+          <a:xfrm flipV="1">
+            <a:off x="2214546" y="6572272"/>
+            <a:ext cx="6786610" cy="142876"/>
+          </a:xfrm>
+          <a:prstGeom prst="rect">
+            <a:avLst/>
+          </a:prstGeom>
+          <a:solidFill>
+            <a:schemeClr val="tx1"/>
+          </a:solidFill>
+          <a:ln>
+            <a:noFill/>
+          </a:ln>
+        </p:spPr>
+        <p:style>
+          <a:lnRef idx="2">
+            <a:schemeClr val="accent1">
+              <a:shade val="50000"/>
+            </a:schemeClr>
+          </a:lnRef>
+          <a:fillRef idx="1">
+            <a:schemeClr val="accent1"/>
+          </a:fillRef>
+          <a:effectRef idx="0">
+            <a:schemeClr val="accent1"/>
+          </a:effectRef>
+          <a:fontRef idx="minor">
+            <a:schemeClr val="lt1"/>
+          </a:fontRef>
+        </p:style>
+        <p:txBody>
+          <a:bodyPr rtlCol="0" anchor="ctr"/>
+          <a:lstStyle/>
+          <a:p>
+            <a:pPr algn="ctr"/>
+            <a:endParaRPr lang="en-CA"/>
+          </a:p>
+        </p:txBody>
+      </p:sp>
+      <p:sp>
+        <p:nvSpPr>
+          <p:cNvPr id="10" name="Title 9"/>
+          <p:cNvSpPr>
+            <a:spLocks noGrp="1"/>
+          </p:cNvSpPr>
+          <p:nvPr>
+            <p:ph type="title"/>
+          </p:nvPr>
+        </p:nvSpPr>
+        <p:spPr/>
+        <p:txBody>
+          <a:bodyPr/>
+          <a:lstStyle/>
+          <a:p>
+            <a:r>
+              <a:rPr lang="en-CA" b="1" dirty="0" smtClean="0"/>
+              <a:t>Design Process</a:t>
+            </a:r>
+            <a:endParaRPr lang="en-CA" b="1" dirty="0"/>
+          </a:p>
+        </p:txBody>
+      </p:sp>
+      <p:sp>
+        <p:nvSpPr>
+          <p:cNvPr id="11" name="Content Placeholder 10"/>
+          <p:cNvSpPr>
+            <a:spLocks noGrp="1"/>
+          </p:cNvSpPr>
+          <p:nvPr>
+            <p:ph idx="1"/>
+          </p:nvPr>
+        </p:nvSpPr>
+        <p:spPr/>
+        <p:txBody>
+          <a:bodyPr/>
+          <a:lstStyle/>
+          <a:p>
+            <a:r>
+              <a:rPr lang="en-CA" dirty="0" smtClean="0"/>
+              <a:t>How to display data</a:t>
+            </a:r>
+          </a:p>
+          <a:p>
+            <a:endParaRPr lang="en-CA" dirty="0" smtClean="0"/>
+          </a:p>
+          <a:p>
+            <a:r>
+              <a:rPr lang="en-CA" dirty="0" smtClean="0"/>
+              <a:t>What managers want to see</a:t>
+            </a:r>
+          </a:p>
+          <a:p>
+            <a:endParaRPr lang="en-CA" dirty="0" smtClean="0"/>
+          </a:p>
+          <a:p>
+            <a:r>
+              <a:rPr lang="en-CA" dirty="0" smtClean="0"/>
+              <a:t>Keep things simple</a:t>
+            </a:r>
+          </a:p>
+          <a:p>
+            <a:endParaRPr lang="en-CA" dirty="0" smtClean="0"/>
           </a:p>
           <a:p>
             <a:endParaRPr lang="en-CA" dirty="0" smtClean="0"/>
@@ -5588,7 +5473,7 @@
           <a:lstStyle/>
           <a:p>
             <a:pPr algn="ctr"/>
-            <a:endParaRPr lang="en-CA" dirty="0"/>
+            <a:endParaRPr lang="en-CA"/>
           </a:p>
         </p:txBody>
       </p:sp>
@@ -5679,7 +5564,7 @@
           <a:p>
             <a:r>
               <a:rPr lang="en-CA" b="1" dirty="0" smtClean="0"/>
-              <a:t>Next Steps / Future Goals</a:t>
+              <a:t>Development Process</a:t>
             </a:r>
             <a:endParaRPr lang="en-CA" b="1" dirty="0"/>
           </a:p>
@@ -5706,7 +5591,22 @@
             <a:endParaRPr lang="en-CA" dirty="0" smtClean="0"/>
           </a:p>
           <a:p>
-            <a:endParaRPr lang="en-CA" dirty="0"/>
+            <a:r>
+              <a:rPr lang="en-CA" dirty="0" smtClean="0"/>
+              <a:t>End-to-End development cycle</a:t>
+            </a:r>
+          </a:p>
+          <a:p>
+            <a:endParaRPr lang="en-CA" dirty="0" smtClean="0"/>
+          </a:p>
+          <a:p>
+            <a:r>
+              <a:rPr lang="en-CA" dirty="0" smtClean="0"/>
+              <a:t>Quick, regular team meetings to discuss major obstacles and progress</a:t>
+            </a:r>
+          </a:p>
+          <a:p>
+            <a:endParaRPr lang="en-CA" dirty="0" smtClean="0"/>
           </a:p>
         </p:txBody>
       </p:sp>
@@ -5754,7 +5654,7 @@
       </p:cxnSp>
       <p:sp>
         <p:nvSpPr>
-          <p:cNvPr id="16" name="Slide Number Placeholder 15"/>
+          <p:cNvPr id="9" name="Slide Number Placeholder 8"/>
           <p:cNvSpPr>
             <a:spLocks noGrp="1"/>
           </p:cNvSpPr>
@@ -5776,6 +5676,279 @@
               <a:rPr lang="en-CA" smtClean="0"/>
               <a:pPr/>
               <a:t>8</a:t>
+            </a:fld>
+            <a:endParaRPr lang="en-CA" dirty="0"/>
+          </a:p>
+        </p:txBody>
+      </p:sp>
+    </p:spTree>
+  </p:cSld>
+  <p:clrMapOvr>
+    <a:masterClrMapping/>
+  </p:clrMapOvr>
+</p:sld>
+</file>
+
+<file path=ppt/slides/slide9.xml><?xml version="1.0" encoding="utf-8"?>
+<p:sld xmlns:a="http://schemas.openxmlformats.org/drawingml/2006/main" xmlns:r="http://schemas.openxmlformats.org/officeDocument/2006/relationships" xmlns:p="http://schemas.openxmlformats.org/presentationml/2006/main">
+  <p:cSld>
+    <p:bg>
+      <p:bgPr>
+        <a:solidFill>
+          <a:schemeClr val="bg1"/>
+        </a:solidFill>
+        <a:effectLst/>
+      </p:bgPr>
+    </p:bg>
+    <p:spTree>
+      <p:nvGrpSpPr>
+        <p:cNvPr id="1" name=""/>
+        <p:cNvGrpSpPr/>
+        <p:nvPr/>
+      </p:nvGrpSpPr>
+      <p:grpSpPr>
+        <a:xfrm>
+          <a:off x="0" y="0"/>
+          <a:ext cx="0" cy="0"/>
+          <a:chOff x="0" y="0"/>
+          <a:chExt cx="0" cy="0"/>
+        </a:xfrm>
+      </p:grpSpPr>
+      <p:sp>
+        <p:nvSpPr>
+          <p:cNvPr id="5" name="Rectangle 4"/>
+          <p:cNvSpPr/>
+          <p:nvPr/>
+        </p:nvSpPr>
+        <p:spPr>
+          <a:xfrm>
+            <a:off x="2214546" y="6286520"/>
+            <a:ext cx="6786610" cy="285752"/>
+          </a:xfrm>
+          <a:prstGeom prst="rect">
+            <a:avLst/>
+          </a:prstGeom>
+          <a:solidFill>
+            <a:srgbClr val="FF0000">
+              <a:alpha val="90000"/>
+            </a:srgbClr>
+          </a:solidFill>
+          <a:ln>
+            <a:noFill/>
+          </a:ln>
+        </p:spPr>
+        <p:style>
+          <a:lnRef idx="2">
+            <a:schemeClr val="accent1">
+              <a:shade val="50000"/>
+            </a:schemeClr>
+          </a:lnRef>
+          <a:fillRef idx="1">
+            <a:schemeClr val="accent1"/>
+          </a:fillRef>
+          <a:effectRef idx="0">
+            <a:schemeClr val="accent1"/>
+          </a:effectRef>
+          <a:fontRef idx="minor">
+            <a:schemeClr val="lt1"/>
+          </a:fontRef>
+        </p:style>
+        <p:txBody>
+          <a:bodyPr rtlCol="0" anchor="ctr"/>
+          <a:lstStyle/>
+          <a:p>
+            <a:pPr algn="ctr"/>
+            <a:endParaRPr lang="en-CA" dirty="0"/>
+          </a:p>
+        </p:txBody>
+      </p:sp>
+      <p:pic>
+        <p:nvPicPr>
+          <p:cNvPr id="6" name="Picture 5" descr="CarletonLogo.gif"/>
+          <p:cNvPicPr>
+            <a:picLocks noChangeAspect="1"/>
+          </p:cNvPicPr>
+          <p:nvPr/>
+        </p:nvPicPr>
+        <p:blipFill>
+          <a:blip r:embed="rId2" cstate="print"/>
+          <a:stretch>
+            <a:fillRect/>
+          </a:stretch>
+        </p:blipFill>
+        <p:spPr>
+          <a:xfrm>
+            <a:off x="142844" y="6215082"/>
+            <a:ext cx="1940334" cy="500042"/>
+          </a:xfrm>
+          <a:prstGeom prst="rect">
+            <a:avLst/>
+          </a:prstGeom>
+        </p:spPr>
+      </p:pic>
+      <p:sp>
+        <p:nvSpPr>
+          <p:cNvPr id="7" name="Rectangle 6"/>
+          <p:cNvSpPr/>
+          <p:nvPr/>
+        </p:nvSpPr>
+        <p:spPr>
+          <a:xfrm flipV="1">
+            <a:off x="2214546" y="6572272"/>
+            <a:ext cx="6786610" cy="142876"/>
+          </a:xfrm>
+          <a:prstGeom prst="rect">
+            <a:avLst/>
+          </a:prstGeom>
+          <a:solidFill>
+            <a:schemeClr val="tx1"/>
+          </a:solidFill>
+          <a:ln>
+            <a:noFill/>
+          </a:ln>
+        </p:spPr>
+        <p:style>
+          <a:lnRef idx="2">
+            <a:schemeClr val="accent1">
+              <a:shade val="50000"/>
+            </a:schemeClr>
+          </a:lnRef>
+          <a:fillRef idx="1">
+            <a:schemeClr val="accent1"/>
+          </a:fillRef>
+          <a:effectRef idx="0">
+            <a:schemeClr val="accent1"/>
+          </a:effectRef>
+          <a:fontRef idx="minor">
+            <a:schemeClr val="lt1"/>
+          </a:fontRef>
+        </p:style>
+        <p:txBody>
+          <a:bodyPr rtlCol="0" anchor="ctr"/>
+          <a:lstStyle/>
+          <a:p>
+            <a:pPr algn="ctr"/>
+            <a:endParaRPr lang="en-CA"/>
+          </a:p>
+        </p:txBody>
+      </p:sp>
+      <p:sp>
+        <p:nvSpPr>
+          <p:cNvPr id="10" name="Title 9"/>
+          <p:cNvSpPr>
+            <a:spLocks noGrp="1"/>
+          </p:cNvSpPr>
+          <p:nvPr>
+            <p:ph type="title"/>
+          </p:nvPr>
+        </p:nvSpPr>
+        <p:spPr/>
+        <p:txBody>
+          <a:bodyPr/>
+          <a:lstStyle/>
+          <a:p>
+            <a:r>
+              <a:rPr lang="en-CA" b="1" dirty="0" smtClean="0"/>
+              <a:t>Next Steps / Future Goals</a:t>
+            </a:r>
+            <a:endParaRPr lang="en-CA" b="1" dirty="0"/>
+          </a:p>
+        </p:txBody>
+      </p:sp>
+      <p:sp>
+        <p:nvSpPr>
+          <p:cNvPr id="11" name="Content Placeholder 10"/>
+          <p:cNvSpPr>
+            <a:spLocks noGrp="1"/>
+          </p:cNvSpPr>
+          <p:nvPr>
+            <p:ph idx="1"/>
+          </p:nvPr>
+        </p:nvSpPr>
+        <p:spPr/>
+        <p:txBody>
+          <a:bodyPr/>
+          <a:lstStyle/>
+          <a:p>
+            <a:r>
+              <a:rPr lang="en-CA" dirty="0" smtClean="0"/>
+              <a:t>Add more specialized functionality</a:t>
+            </a:r>
+          </a:p>
+          <a:p>
+            <a:endParaRPr lang="en-CA" dirty="0" smtClean="0"/>
+          </a:p>
+          <a:p>
+            <a:endParaRPr lang="en-CA" dirty="0" smtClean="0"/>
+          </a:p>
+        </p:txBody>
+      </p:sp>
+      <p:cxnSp>
+        <p:nvCxnSpPr>
+          <p:cNvPr id="12" name="Straight Connector 11"/>
+          <p:cNvCxnSpPr/>
+          <p:nvPr/>
+        </p:nvCxnSpPr>
+        <p:spPr>
+          <a:xfrm>
+            <a:off x="2214546" y="6572272"/>
+            <a:ext cx="6786610" cy="1588"/>
+          </a:xfrm>
+          <a:prstGeom prst="line">
+            <a:avLst/>
+          </a:prstGeom>
+          <a:ln w="12700">
+            <a:solidFill>
+              <a:schemeClr val="bg1"/>
+            </a:solidFill>
+          </a:ln>
+          <a:effectLst>
+            <a:outerShdw blurRad="88900" sx="102000" sy="102000" algn="ctr" rotWithShape="0">
+              <a:schemeClr val="bg1">
+                <a:alpha val="61000"/>
+              </a:schemeClr>
+            </a:outerShdw>
+          </a:effectLst>
+        </p:spPr>
+        <p:style>
+          <a:lnRef idx="1">
+            <a:schemeClr val="accent1"/>
+          </a:lnRef>
+          <a:fillRef idx="0">
+            <a:schemeClr val="accent1"/>
+          </a:fillRef>
+          <a:effectRef idx="0">
+            <a:schemeClr val="accent1"/>
+          </a:effectRef>
+          <a:fontRef idx="minor">
+            <a:schemeClr val="tx1"/>
+          </a:fontRef>
+        </p:style>
+      </p:cxnSp>
+      <p:sp>
+        <p:nvSpPr>
+          <p:cNvPr id="16" name="Slide Number Placeholder 15"/>
+          <p:cNvSpPr>
+            <a:spLocks noGrp="1"/>
+          </p:cNvSpPr>
+          <p:nvPr>
+            <p:ph type="sldNum" sz="quarter" idx="12"/>
+          </p:nvPr>
+        </p:nvSpPr>
+        <p:spPr>
+          <a:xfrm>
+            <a:off x="6553200" y="6286520"/>
+            <a:ext cx="2133600" cy="365125"/>
+          </a:xfrm>
+        </p:spPr>
+        <p:txBody>
+          <a:bodyPr/>
+          <a:lstStyle/>
+          <a:p>
+            <a:fld id="{3E1D218B-D0C8-4B57-A33A-A84CB916D2FC}" type="slidenum">
+              <a:rPr lang="en-CA" smtClean="0"/>
+              <a:pPr/>
+              <a:t>9</a:t>
             </a:fld>
             <a:endParaRPr lang="en-CA" dirty="0"/>
           </a:p>

</xml_diff>

<commit_message>
added email notifications and updated docs
</commit_message>
<xml_diff>
--- a/Presentation.pptx
+++ b/Presentation.pptx
@@ -4438,10 +4438,6 @@
             <a:endParaRPr lang="en-CA" dirty="0" smtClean="0"/>
           </a:p>
           <a:p>
-            <a:r>
-              <a:rPr lang="en-CA" dirty="0" smtClean="0"/>
-              <a:t> </a:t>
-            </a:r>
             <a:endParaRPr lang="en-CA" dirty="0" smtClean="0"/>
           </a:p>
         </p:txBody>
@@ -5585,6 +5581,10 @@
           <a:bodyPr/>
           <a:lstStyle/>
           <a:p>
+            <a:r>
+              <a:rPr lang="en-CA" dirty="0" smtClean="0"/>
+              <a:t>Research into specific problem solutions</a:t>
+            </a:r>
             <a:endParaRPr lang="en-CA" dirty="0" smtClean="0"/>
           </a:p>
           <a:p>
@@ -5872,7 +5872,25 @@
           <a:p>
             <a:r>
               <a:rPr lang="en-CA" dirty="0" smtClean="0"/>
-              <a:t>Add more specialized functionality</a:t>
+              <a:t>Add ability to manually edit data</a:t>
+            </a:r>
+          </a:p>
+          <a:p>
+            <a:endParaRPr lang="en-CA" dirty="0" smtClean="0"/>
+          </a:p>
+          <a:p>
+            <a:r>
+              <a:rPr lang="en-CA" dirty="0" smtClean="0"/>
+              <a:t>Add email notifications</a:t>
+            </a:r>
+          </a:p>
+          <a:p>
+            <a:endParaRPr lang="en-CA" dirty="0" smtClean="0"/>
+          </a:p>
+          <a:p>
+            <a:r>
+              <a:rPr lang="en-CA" dirty="0" smtClean="0"/>
+              <a:t>Add exporting capabilities</a:t>
             </a:r>
           </a:p>
           <a:p>

</xml_diff>

<commit_message>
Presentation stuff, fixed typo
</commit_message>
<xml_diff>
--- a/Presentation.pptx
+++ b/Presentation.pptx
@@ -115,6 +115,22 @@
       </a:defRPr>
     </a:lvl9pPr>
   </p:defaultTextStyle>
+  <p:extLst>
+    <p:ext uri="{EFAFB233-063F-42B5-8137-9DF3F51BA10A}">
+      <p15:sldGuideLst xmlns:p15="http://schemas.microsoft.com/office/powerpoint/2012/main">
+        <p15:guide id="1" orient="horz" pos="2160">
+          <p15:clr>
+            <a:srgbClr val="A4A3A4"/>
+          </p15:clr>
+        </p15:guide>
+        <p15:guide id="2" pos="2880">
+          <p15:clr>
+            <a:srgbClr val="A4A3A4"/>
+          </p15:clr>
+        </p15:guide>
+      </p15:sldGuideLst>
+    </p:ext>
+  </p:extLst>
 </p:presentation>
 </file>
 
@@ -370,6 +386,11 @@
         </p:txBody>
       </p:sp>
     </p:spTree>
+    <p:extLst>
+      <p:ext uri="{BB962C8B-B14F-4D97-AF65-F5344CB8AC3E}">
+        <p14:creationId xmlns:p14="http://schemas.microsoft.com/office/powerpoint/2010/main" val="3294518330"/>
+      </p:ext>
+    </p:extLst>
   </p:cSld>
   <p:clrMap bg1="lt1" tx1="dk1" bg2="lt2" tx2="dk2" accent1="accent1" accent2="accent2" accent3="accent3" accent4="accent4" accent5="accent5" accent6="accent6" hlink="hlink" folHlink="folHlink"/>
   <p:notesStyle>
@@ -542,6 +563,11 @@
         </p:txBody>
       </p:sp>
     </p:spTree>
+    <p:extLst>
+      <p:ext uri="{BB962C8B-B14F-4D97-AF65-F5344CB8AC3E}">
+        <p14:creationId xmlns:p14="http://schemas.microsoft.com/office/powerpoint/2010/main" val="2085882507"/>
+      </p:ext>
+    </p:extLst>
   </p:cSld>
   <p:clrMapOvr>
     <a:masterClrMapping/>
@@ -3999,20 +4025,27 @@
         </p:nvSpPr>
         <p:spPr/>
         <p:txBody>
-          <a:bodyPr/>
+          <a:bodyPr>
+            <a:normAutofit lnSpcReduction="10000"/>
+          </a:bodyPr>
           <a:lstStyle/>
           <a:p>
             <a:r>
               <a:rPr lang="en-CA" dirty="0" smtClean="0"/>
-              <a:t>Create easy to use, </a:t>
-            </a:r>
+              <a:t>Create easy to use, autonomous management system</a:t>
+            </a:r>
+          </a:p>
+          <a:p>
+            <a:endParaRPr lang="en-CA" dirty="0" smtClean="0"/>
+          </a:p>
+          <a:p>
             <a:r>
               <a:rPr lang="en-CA" dirty="0" smtClean="0"/>
-              <a:t>autonomous </a:t>
+              <a:t>Manage both products and </a:t>
             </a:r>
             <a:r>
               <a:rPr lang="en-CA" dirty="0" smtClean="0"/>
-              <a:t>management system</a:t>
+              <a:t>volunteers</a:t>
             </a:r>
           </a:p>
           <a:p>
@@ -4021,8 +4054,17 @@
           <a:p>
             <a:r>
               <a:rPr lang="en-CA" dirty="0" smtClean="0"/>
-              <a:t>Manage both products and volunteers</a:t>
-            </a:r>
+              <a:t>Import data from existing </a:t>
+            </a:r>
+            <a:r>
+              <a:rPr lang="en-CA" dirty="0" err="1" smtClean="0"/>
+              <a:t>docx</a:t>
+            </a:r>
+            <a:r>
+              <a:rPr lang="en-CA" dirty="0" smtClean="0"/>
+              <a:t> files</a:t>
+            </a:r>
+            <a:endParaRPr lang="en-CA" dirty="0" smtClean="0"/>
           </a:p>
           <a:p>
             <a:endParaRPr lang="en-CA" dirty="0" smtClean="0"/>
@@ -4405,7 +4447,7 @@
           <a:p>
             <a:r>
               <a:rPr lang="en-CA" dirty="0" smtClean="0"/>
-              <a:t>Both overall and by-batch views</a:t>
+              <a:t>Simple and batch-specific views</a:t>
             </a:r>
           </a:p>
           <a:p>
@@ -4431,8 +4473,18 @@
             </a:r>
             <a:r>
               <a:rPr lang="en-CA" dirty="0" smtClean="0"/>
-              <a:t> files</a:t>
-            </a:r>
+              <a:t> </a:t>
+            </a:r>
+            <a:r>
+              <a:rPr lang="en-CA" dirty="0" smtClean="0"/>
+              <a:t>files</a:t>
+            </a:r>
+          </a:p>
+          <a:p>
+            <a:endParaRPr lang="en-CA" dirty="0"/>
+          </a:p>
+          <a:p>
+            <a:endParaRPr lang="en-CA" dirty="0" smtClean="0"/>
           </a:p>
           <a:p>
             <a:endParaRPr lang="en-CA" dirty="0" smtClean="0"/>
@@ -4711,8 +4763,13 @@
           <a:p>
             <a:r>
               <a:rPr lang="en-CA" dirty="0" smtClean="0"/>
-              <a:t>Easily maintainable and scalable</a:t>
-            </a:r>
+              <a:t>Easily maintainable and </a:t>
+            </a:r>
+            <a:r>
+              <a:rPr lang="en-CA" dirty="0" smtClean="0"/>
+              <a:t>scalable</a:t>
+            </a:r>
+            <a:endParaRPr lang="en-CA" dirty="0" smtClean="0"/>
           </a:p>
           <a:p>
             <a:endParaRPr lang="en-CA" dirty="0" smtClean="0"/>
@@ -4729,7 +4786,11 @@
           <a:p>
             <a:r>
               <a:rPr lang="en-CA" dirty="0" smtClean="0"/>
-              <a:t>Designed for the future</a:t>
+              <a:t>Designed for </a:t>
+            </a:r>
+            <a:r>
+              <a:rPr lang="en-CA" dirty="0" smtClean="0"/>
+              <a:t>long-term use</a:t>
             </a:r>
             <a:endParaRPr lang="en-CA" dirty="0" smtClean="0"/>
           </a:p>
@@ -4993,14 +5054,26 @@
         <p:spPr/>
         <p:txBody>
           <a:bodyPr>
-            <a:normAutofit lnSpcReduction="10000"/>
+            <a:normAutofit fontScale="92500" lnSpcReduction="10000"/>
           </a:bodyPr>
           <a:lstStyle/>
           <a:p>
             <a:r>
               <a:rPr lang="en-CA" dirty="0" smtClean="0"/>
-              <a:t>Recognize major obstacles, priorities</a:t>
-            </a:r>
+              <a:t>Recognize major obstacles, </a:t>
+            </a:r>
+            <a:r>
+              <a:rPr lang="en-CA" dirty="0" smtClean="0"/>
+              <a:t>priorities</a:t>
+            </a:r>
+          </a:p>
+          <a:p>
+            <a:pPr lvl="1"/>
+            <a:r>
+              <a:rPr lang="en-CA" dirty="0" smtClean="0"/>
+              <a:t>Ad Hoc approach to problem</a:t>
+            </a:r>
+            <a:endParaRPr lang="en-CA" dirty="0" smtClean="0"/>
           </a:p>
           <a:p>
             <a:endParaRPr lang="en-CA" dirty="0" smtClean="0"/>
@@ -5024,8 +5097,13 @@
           <a:p>
             <a:r>
               <a:rPr lang="en-CA" dirty="0" smtClean="0"/>
-              <a:t>Delegation of tasks</a:t>
-            </a:r>
+              <a:t>Delegation of </a:t>
+            </a:r>
+            <a:r>
+              <a:rPr lang="en-CA" dirty="0" smtClean="0"/>
+              <a:t>tasks</a:t>
+            </a:r>
+            <a:endParaRPr lang="en-CA" dirty="0" smtClean="0"/>
           </a:p>
           <a:p>
             <a:endParaRPr lang="en-CA" dirty="0" smtClean="0"/>
@@ -5292,17 +5370,42 @@
           <a:p>
             <a:r>
               <a:rPr lang="en-CA" dirty="0" smtClean="0"/>
-              <a:t>How to display data</a:t>
-            </a:r>
-          </a:p>
-          <a:p>
+              <a:t>How to display </a:t>
+            </a:r>
+            <a:r>
+              <a:rPr lang="en-CA" dirty="0" smtClean="0"/>
+              <a:t>the data?</a:t>
+            </a:r>
             <a:endParaRPr lang="en-CA" dirty="0" smtClean="0"/>
           </a:p>
           <a:p>
+            <a:endParaRPr lang="en-CA" dirty="0" smtClean="0"/>
+          </a:p>
+          <a:p>
             <a:r>
               <a:rPr lang="en-CA" dirty="0" smtClean="0"/>
-              <a:t>What managers want to see</a:t>
-            </a:r>
+              <a:t>What </a:t>
+            </a:r>
+            <a:r>
+              <a:rPr lang="en-CA" dirty="0" smtClean="0"/>
+              <a:t>do managers </a:t>
+            </a:r>
+            <a:r>
+              <a:rPr lang="en-CA" dirty="0" smtClean="0"/>
+              <a:t>want to </a:t>
+            </a:r>
+            <a:r>
+              <a:rPr lang="en-CA" dirty="0" smtClean="0"/>
+              <a:t>see?</a:t>
+            </a:r>
+          </a:p>
+          <a:p>
+            <a:pPr lvl="1"/>
+            <a:r>
+              <a:rPr lang="en-CA" dirty="0" smtClean="0"/>
+              <a:t>Important information up front, details when asked</a:t>
+            </a:r>
+            <a:endParaRPr lang="en-CA" dirty="0" smtClean="0"/>
           </a:p>
           <a:p>
             <a:endParaRPr lang="en-CA" dirty="0" smtClean="0"/>
@@ -5585,7 +5688,6 @@
               <a:rPr lang="en-CA" dirty="0" smtClean="0"/>
               <a:t>Research into specific problem solutions</a:t>
             </a:r>
-            <a:endParaRPr lang="en-CA" dirty="0" smtClean="0"/>
           </a:p>
           <a:p>
             <a:endParaRPr lang="en-CA" dirty="0" smtClean="0"/>

</xml_diff>